<commit_message>
chat model compare GPT3 Llama2 Mistral
</commit_message>
<xml_diff>
--- a/presentation_generated/presentation_gpt3.pptx
+++ b/presentation_generated/presentation_gpt3.pptx
@@ -4,6 +4,14 @@
   <p:sldMasterIdLst>
     <p:sldMasterId id="2147483648" r:id="rId1"/>
   </p:sldMasterIdLst>
+  <p:sldIdLst>
+    <p:sldId id="256" r:id="rId7"/>
+    <p:sldId id="257" r:id="rId8"/>
+    <p:sldId id="258" r:id="rId9"/>
+    <p:sldId id="259" r:id="rId10"/>
+    <p:sldId id="260" r:id="rId11"/>
+    <p:sldId id="261" r:id="rId12"/>
+  </p:sldIdLst>
   <p:sldSz cx="9144000" cy="6858000" type="screen4x3"/>
   <p:notesSz cx="6858000" cy="9144000"/>
   <p:defaultTextStyle>
@@ -3073,6 +3081,416 @@
     </p:otherStyle>
   </p:txStyles>
 </p:sldMaster>
+</file>
+
+<file path=ppt/slides/slide1.xml><?xml version="1.0" encoding="utf-8"?>
+<p:sld xmlns:a="http://schemas.openxmlformats.org/drawingml/2006/main" xmlns:p="http://schemas.openxmlformats.org/presentationml/2006/main" xmlns:r="http://schemas.openxmlformats.org/officeDocument/2006/relationships">
+  <p:cSld>
+    <p:spTree>
+      <p:nvGrpSpPr>
+        <p:cNvPr id="1" name=""/>
+        <p:cNvGrpSpPr/>
+        <p:nvPr/>
+      </p:nvGrpSpPr>
+      <p:grpSpPr/>
+      <p:sp>
+        <p:nvSpPr>
+          <p:cNvPr id="2" name="Title 1"/>
+          <p:cNvSpPr>
+            <a:spLocks noGrp="1"/>
+          </p:cNvSpPr>
+          <p:nvPr>
+            <p:ph type="title"/>
+          </p:nvPr>
+        </p:nvSpPr>
+        <p:spPr/>
+        <p:txBody>
+          <a:bodyPr/>
+          <a:lstStyle/>
+          <a:p>
+            <a:r>
+              <a:t>Introduction</a:t>
+            </a:r>
+          </a:p>
+        </p:txBody>
+      </p:sp>
+      <p:sp>
+        <p:nvSpPr>
+          <p:cNvPr id="3" name="Content Placeholder 2"/>
+          <p:cNvSpPr>
+            <a:spLocks noGrp="1"/>
+          </p:cNvSpPr>
+          <p:nvPr>
+            <p:ph idx="1"/>
+          </p:nvPr>
+        </p:nvSpPr>
+        <p:spPr/>
+        <p:txBody>
+          <a:bodyPr/>
+          <a:lstStyle/>
+          <a:p>
+            <a:r>
+              <a:t>- Introduction of the problem of Generalized Category Discovery (GCD) in fine-grained datasets.</a:t>
+            </a:r>
+          </a:p>
+          <a:p>
+            <a:r>
+              <a:t>- Description of the challenges faced in fine-grained classification tasks due to high class similarities and intra-class variances.</a:t>
+            </a:r>
+          </a:p>
+        </p:txBody>
+      </p:sp>
+    </p:spTree>
+  </p:cSld>
+  <p:clrMapOvr>
+    <a:masterClrMapping/>
+  </p:clrMapOvr>
+</p:sld>
+</file>
+
+<file path=ppt/slides/slide2.xml><?xml version="1.0" encoding="utf-8"?>
+<p:sld xmlns:a="http://schemas.openxmlformats.org/drawingml/2006/main" xmlns:p="http://schemas.openxmlformats.org/presentationml/2006/main" xmlns:r="http://schemas.openxmlformats.org/officeDocument/2006/relationships">
+  <p:cSld>
+    <p:spTree>
+      <p:nvGrpSpPr>
+        <p:cNvPr id="1" name=""/>
+        <p:cNvGrpSpPr/>
+        <p:nvPr/>
+      </p:nvGrpSpPr>
+      <p:grpSpPr/>
+      <p:sp>
+        <p:nvSpPr>
+          <p:cNvPr id="2" name="Title 1"/>
+          <p:cNvSpPr>
+            <a:spLocks noGrp="1"/>
+          </p:cNvSpPr>
+          <p:nvPr>
+            <p:ph type="title"/>
+          </p:nvPr>
+        </p:nvSpPr>
+        <p:spPr/>
+        <p:txBody>
+          <a:bodyPr/>
+          <a:lstStyle/>
+          <a:p>
+            <a:r>
+              <a:t>Related Works</a:t>
+            </a:r>
+          </a:p>
+        </p:txBody>
+      </p:sp>
+      <p:sp>
+        <p:nvSpPr>
+          <p:cNvPr id="3" name="Content Placeholder 2"/>
+          <p:cNvSpPr>
+            <a:spLocks noGrp="1"/>
+          </p:cNvSpPr>
+          <p:nvPr>
+            <p:ph idx="1"/>
+          </p:nvPr>
+        </p:nvSpPr>
+        <p:spPr/>
+        <p:txBody>
+          <a:bodyPr/>
+          <a:lstStyle/>
+          <a:p>
+            <a:r>
+              <a:t>- Overview of Novel Category Discovery (NCD) and its relevance to XCon's objectives.</a:t>
+            </a:r>
+          </a:p>
+          <a:p>
+            <a:r>
+              <a:t>- Discussion on previous approaches utilizing transfer learning, self-supervision, and contrastive learning in categorizing unseen classes.</a:t>
+            </a:r>
+          </a:p>
+        </p:txBody>
+      </p:sp>
+    </p:spTree>
+  </p:cSld>
+  <p:clrMapOvr>
+    <a:masterClrMapping/>
+  </p:clrMapOvr>
+</p:sld>
+</file>
+
+<file path=ppt/slides/slide3.xml><?xml version="1.0" encoding="utf-8"?>
+<p:sld xmlns:a="http://schemas.openxmlformats.org/drawingml/2006/main" xmlns:p="http://schemas.openxmlformats.org/presentationml/2006/main" xmlns:r="http://schemas.openxmlformats.org/officeDocument/2006/relationships">
+  <p:cSld>
+    <p:spTree>
+      <p:nvGrpSpPr>
+        <p:cNvPr id="1" name=""/>
+        <p:cNvGrpSpPr/>
+        <p:nvPr/>
+      </p:nvGrpSpPr>
+      <p:grpSpPr/>
+      <p:sp>
+        <p:nvSpPr>
+          <p:cNvPr id="2" name="Title 1"/>
+          <p:cNvSpPr>
+            <a:spLocks noGrp="1"/>
+          </p:cNvSpPr>
+          <p:nvPr>
+            <p:ph type="title"/>
+          </p:nvPr>
+        </p:nvSpPr>
+        <p:spPr/>
+        <p:txBody>
+          <a:bodyPr/>
+          <a:lstStyle/>
+          <a:p>
+            <a:r>
+              <a:t>Methodology</a:t>
+            </a:r>
+          </a:p>
+        </p:txBody>
+      </p:sp>
+      <p:sp>
+        <p:nvSpPr>
+          <p:cNvPr id="3" name="Content Placeholder 2"/>
+          <p:cNvSpPr>
+            <a:spLocks noGrp="1"/>
+          </p:cNvSpPr>
+          <p:nvPr>
+            <p:ph idx="1"/>
+          </p:nvPr>
+        </p:nvSpPr>
+        <p:spPr/>
+        <p:txBody>
+          <a:bodyPr/>
+          <a:lstStyle/>
+          <a:p>
+            <a:r>
+              <a:t>- Explanation of Expert-Contrastive Learning (XCon) approach.</a:t>
+            </a:r>
+          </a:p>
+          <a:p>
+            <a:r>
+              <a:t>- Description of partitioning the dataset into expert sub-datasets using k-means clustering.</a:t>
+            </a:r>
+          </a:p>
+          <a:p>
+            <a:r>
+              <a:t>- Details on supervised and unsupervised contrastive learning across full and sub-datasets.</a:t>
+            </a:r>
+          </a:p>
+        </p:txBody>
+      </p:sp>
+    </p:spTree>
+  </p:cSld>
+  <p:clrMapOvr>
+    <a:masterClrMapping/>
+  </p:clrMapOvr>
+</p:sld>
+</file>
+
+<file path=ppt/slides/slide4.xml><?xml version="1.0" encoding="utf-8"?>
+<p:sld xmlns:a="http://schemas.openxmlformats.org/drawingml/2006/main" xmlns:p="http://schemas.openxmlformats.org/presentationml/2006/main" xmlns:r="http://schemas.openxmlformats.org/officeDocument/2006/relationships">
+  <p:cSld>
+    <p:spTree>
+      <p:nvGrpSpPr>
+        <p:cNvPr id="1" name=""/>
+        <p:cNvGrpSpPr/>
+        <p:nvPr/>
+      </p:nvGrpSpPr>
+      <p:grpSpPr/>
+      <p:sp>
+        <p:nvSpPr>
+          <p:cNvPr id="2" name="Title 1"/>
+          <p:cNvSpPr>
+            <a:spLocks noGrp="1"/>
+          </p:cNvSpPr>
+          <p:nvPr>
+            <p:ph type="title"/>
+          </p:nvPr>
+        </p:nvSpPr>
+        <p:spPr/>
+        <p:txBody>
+          <a:bodyPr/>
+          <a:lstStyle/>
+          <a:p>
+            <a:r>
+              <a:t>Experiments and Results</a:t>
+            </a:r>
+          </a:p>
+        </p:txBody>
+      </p:sp>
+      <p:sp>
+        <p:nvSpPr>
+          <p:cNvPr id="3" name="Content Placeholder 2"/>
+          <p:cNvSpPr>
+            <a:spLocks noGrp="1"/>
+          </p:cNvSpPr>
+          <p:nvPr>
+            <p:ph idx="1"/>
+          </p:nvPr>
+        </p:nvSpPr>
+        <p:spPr/>
+        <p:txBody>
+          <a:bodyPr/>
+          <a:lstStyle/>
+          <a:p>
+            <a:r>
+              <a:t>- Evaluation of XCon on CIFAR-10/100, ImageNet-100, CUB-200, Stanford Cars, FGVC-Aircraft, and Oxford-IIIT Pet datasets.</a:t>
+            </a:r>
+          </a:p>
+          <a:p>
+            <a:r>
+              <a:t>- Showcase of state-of-the-art performance in fine-grained category discovery benchmarks.</a:t>
+            </a:r>
+          </a:p>
+          <a:p>
+            <a:r>
+              <a:t>- Implementation details using ViT-B-16 model and DINO-pretrained parameters.</a:t>
+            </a:r>
+          </a:p>
+        </p:txBody>
+      </p:sp>
+    </p:spTree>
+  </p:cSld>
+  <p:clrMapOvr>
+    <a:masterClrMapping/>
+  </p:clrMapOvr>
+</p:sld>
+</file>
+
+<file path=ppt/slides/slide5.xml><?xml version="1.0" encoding="utf-8"?>
+<p:sld xmlns:a="http://schemas.openxmlformats.org/drawingml/2006/main" xmlns:p="http://schemas.openxmlformats.org/presentationml/2006/main" xmlns:r="http://schemas.openxmlformats.org/officeDocument/2006/relationships">
+  <p:cSld>
+    <p:spTree>
+      <p:nvGrpSpPr>
+        <p:cNvPr id="1" name=""/>
+        <p:cNvGrpSpPr/>
+        <p:nvPr/>
+      </p:nvGrpSpPr>
+      <p:grpSpPr/>
+      <p:sp>
+        <p:nvSpPr>
+          <p:cNvPr id="2" name="Title 1"/>
+          <p:cNvSpPr>
+            <a:spLocks noGrp="1"/>
+          </p:cNvSpPr>
+          <p:nvPr>
+            <p:ph type="title"/>
+          </p:nvPr>
+        </p:nvSpPr>
+        <p:spPr/>
+        <p:txBody>
+          <a:bodyPr/>
+          <a:lstStyle/>
+          <a:p>
+            <a:r>
+              <a:t>Ablation Studies</a:t>
+            </a:r>
+          </a:p>
+        </p:txBody>
+      </p:sp>
+      <p:sp>
+        <p:nvSpPr>
+          <p:cNvPr id="3" name="Content Placeholder 2"/>
+          <p:cNvSpPr>
+            <a:spLocks noGrp="1"/>
+          </p:cNvSpPr>
+          <p:nvPr>
+            <p:ph idx="1"/>
+          </p:nvPr>
+        </p:nvSpPr>
+        <p:spPr/>
+        <p:txBody>
+          <a:bodyPr/>
+          <a:lstStyle/>
+          <a:p>
+            <a:r>
+              <a:t>- Overview of ablation studies conducted to validate components of XCon.</a:t>
+            </a:r>
+          </a:p>
+          <a:p>
+            <a:r>
+              <a:t>- Discussion on the impact of weight of fine-grained loss and the number of sub-datasets.</a:t>
+            </a:r>
+          </a:p>
+          <a:p>
+            <a:r>
+              <a:t>- Insights into optimal settings for different datasets based on experimental results.</a:t>
+            </a:r>
+          </a:p>
+        </p:txBody>
+      </p:sp>
+    </p:spTree>
+  </p:cSld>
+  <p:clrMapOvr>
+    <a:masterClrMapping/>
+  </p:clrMapOvr>
+</p:sld>
+</file>
+
+<file path=ppt/slides/slide6.xml><?xml version="1.0" encoding="utf-8"?>
+<p:sld xmlns:a="http://schemas.openxmlformats.org/drawingml/2006/main" xmlns:p="http://schemas.openxmlformats.org/presentationml/2006/main" xmlns:r="http://schemas.openxmlformats.org/officeDocument/2006/relationships">
+  <p:cSld>
+    <p:spTree>
+      <p:nvGrpSpPr>
+        <p:cNvPr id="1" name=""/>
+        <p:cNvGrpSpPr/>
+        <p:nvPr/>
+      </p:nvGrpSpPr>
+      <p:grpSpPr/>
+      <p:sp>
+        <p:nvSpPr>
+          <p:cNvPr id="2" name="Title 1"/>
+          <p:cNvSpPr>
+            <a:spLocks noGrp="1"/>
+          </p:cNvSpPr>
+          <p:nvPr>
+            <p:ph type="title"/>
+          </p:nvPr>
+        </p:nvSpPr>
+        <p:spPr/>
+        <p:txBody>
+          <a:bodyPr/>
+          <a:lstStyle/>
+          <a:p>
+            <a:r>
+              <a:t>Conclusion</a:t>
+            </a:r>
+          </a:p>
+        </p:txBody>
+      </p:sp>
+      <p:sp>
+        <p:nvSpPr>
+          <p:cNvPr id="3" name="Content Placeholder 2"/>
+          <p:cNvSpPr>
+            <a:spLocks noGrp="1"/>
+          </p:cNvSpPr>
+          <p:nvPr>
+            <p:ph idx="1"/>
+          </p:nvPr>
+        </p:nvSpPr>
+        <p:spPr/>
+        <p:txBody>
+          <a:bodyPr/>
+          <a:lstStyle/>
+          <a:p>
+            <a:r>
+              <a:t>- Summary of XCon's significance in fine-grained category discovery.</a:t>
+            </a:r>
+          </a:p>
+          <a:p>
+            <a:r>
+              <a:t>- Mention of the method's success across various benchmarks and its contribution to unsupervised and semi-supervised learning in fine-grained classification.</a:t>
+            </a:r>
+          </a:p>
+          <a:p>
+            <a:r>
+              <a:t>- Encouragement for further exploration and adaptation of XCon within the research community.</a:t>
+            </a:r>
+          </a:p>
+        </p:txBody>
+      </p:sp>
+    </p:spTree>
+  </p:cSld>
+  <p:clrMapOvr>
+    <a:masterClrMapping/>
+  </p:clrMapOvr>
+</p:sld>
 </file>
 
 <file path=ppt/theme/theme1.xml><?xml version="1.0" encoding="utf-8"?>

</xml_diff>